<commit_message>
Refined Linux introduction slices and added mindmap for this chapter.
</commit_message>
<xml_diff>
--- a/linux_introduction/Linux_Intro.pptx
+++ b/linux_introduction/Linux_Intro.pptx
@@ -5,7 +5,7 @@
     <p:sldMasterId id="2147483660" r:id="rId1"/>
   </p:sldMasterIdLst>
   <p:notesMasterIdLst>
-    <p:notesMasterId r:id="rId17"/>
+    <p:notesMasterId r:id="rId18"/>
   </p:notesMasterIdLst>
   <p:sldIdLst>
     <p:sldId id="256" r:id="rId2"/>
@@ -23,6 +23,7 @@
     <p:sldId id="265" r:id="rId14"/>
     <p:sldId id="268" r:id="rId15"/>
     <p:sldId id="270" r:id="rId16"/>
+    <p:sldId id="271" r:id="rId17"/>
   </p:sldIdLst>
   <p:sldSz cx="9144000" cy="6858000" type="screen4x3"/>
   <p:notesSz cx="6858000" cy="9144000"/>
@@ -3369,7 +3370,8 @@
           <a:p>
             <a:fld id="{C43CBC19-5066-4F68-94FF-06F296C4C2B1}" type="datetimeFigureOut">
               <a:rPr lang="zh-CN" altLang="en-US" smtClean="0"/>
-              <a:t>2016/11/9</a:t>
+              <a:pPr/>
+              <a:t>2016/11/19</a:t>
             </a:fld>
             <a:endParaRPr lang="zh-CN" altLang="en-US"/>
           </a:p>
@@ -3530,6 +3532,7 @@
           <a:p>
             <a:fld id="{5E606EA0-06DC-47A6-97E5-FF75D4543521}" type="slidenum">
               <a:rPr lang="zh-CN" altLang="en-US" smtClean="0"/>
+              <a:pPr/>
               <a:t>‹#›</a:t>
             </a:fld>
             <a:endParaRPr lang="zh-CN" altLang="en-US"/>
@@ -4259,7 +4262,8 @@
           <a:p>
             <a:fld id="{9F7C6C28-6488-4497-82EC-CB1947179437}" type="datetime1">
               <a:rPr lang="zh-CN" altLang="en-US" smtClean="0"/>
-              <a:t>2016/11/9</a:t>
+              <a:pPr/>
+              <a:t>2016/11/19</a:t>
             </a:fld>
             <a:endParaRPr lang="zh-CN" altLang="en-US"/>
           </a:p>
@@ -4456,7 +4460,8 @@
           <a:p>
             <a:fld id="{C8C191B2-40BB-4FF1-892C-177588D8AA80}" type="datetime1">
               <a:rPr lang="zh-CN" altLang="en-US" smtClean="0"/>
-              <a:t>2016/11/9</a:t>
+              <a:pPr/>
+              <a:t>2016/11/19</a:t>
             </a:fld>
             <a:endParaRPr lang="zh-CN" altLang="en-US"/>
           </a:p>
@@ -4642,7 +4647,8 @@
           <a:p>
             <a:fld id="{8DA44AE1-D381-4105-AB8F-772033CEDEC7}" type="datetime1">
               <a:rPr lang="zh-CN" altLang="en-US" smtClean="0"/>
-              <a:t>2016/11/9</a:t>
+              <a:pPr/>
+              <a:t>2016/11/19</a:t>
             </a:fld>
             <a:endParaRPr lang="zh-CN" altLang="en-US"/>
           </a:p>
@@ -4793,7 +4799,8 @@
           <a:p>
             <a:fld id="{DB677575-64E8-4F07-A4E7-DA6C22EFC7CA}" type="datetime1">
               <a:rPr lang="zh-CN" altLang="en-US" smtClean="0"/>
-              <a:t>2016/11/9</a:t>
+              <a:pPr/>
+              <a:t>2016/11/19</a:t>
             </a:fld>
             <a:endParaRPr lang="zh-CN" altLang="en-US"/>
           </a:p>
@@ -5049,7 +5056,8 @@
           <a:p>
             <a:fld id="{1F831EA1-D80A-43E4-BE65-52F1EE3B7AA9}" type="datetime1">
               <a:rPr lang="zh-CN" altLang="en-US" smtClean="0"/>
-              <a:t>2016/11/9</a:t>
+              <a:pPr/>
+              <a:t>2016/11/19</a:t>
             </a:fld>
             <a:endParaRPr lang="zh-CN" altLang="en-US"/>
           </a:p>
@@ -5459,7 +5467,8 @@
           <a:p>
             <a:fld id="{C1211CB4-72B4-4DA1-903A-8BDC6A53ED04}" type="datetime1">
               <a:rPr lang="zh-CN" altLang="en-US" smtClean="0"/>
-              <a:t>2016/11/9</a:t>
+              <a:pPr/>
+              <a:t>2016/11/19</a:t>
             </a:fld>
             <a:endParaRPr lang="zh-CN" altLang="en-US"/>
           </a:p>
@@ -5906,7 +5915,8 @@
           <a:p>
             <a:fld id="{61A96D75-0FCA-4976-8CC1-E96F942E5071}" type="datetime1">
               <a:rPr lang="zh-CN" altLang="en-US" smtClean="0"/>
-              <a:t>2016/11/9</a:t>
+              <a:pPr/>
+              <a:t>2016/11/19</a:t>
             </a:fld>
             <a:endParaRPr lang="zh-CN" altLang="en-US"/>
           </a:p>
@@ -6008,7 +6018,8 @@
           <a:p>
             <a:fld id="{2AB93D58-8977-4A34-AC2A-24994521CD4D}" type="datetime1">
               <a:rPr lang="zh-CN" altLang="en-US" smtClean="0"/>
-              <a:t>2016/11/9</a:t>
+              <a:pPr/>
+              <a:t>2016/11/19</a:t>
             </a:fld>
             <a:endParaRPr lang="zh-CN" altLang="en-US"/>
           </a:p>
@@ -6130,7 +6141,8 @@
           <a:p>
             <a:fld id="{4F6D5504-9878-4CA2-9FE0-0C22D31112B1}" type="datetime1">
               <a:rPr lang="zh-CN" altLang="en-US" smtClean="0"/>
-              <a:t>2016/11/9</a:t>
+              <a:pPr/>
+              <a:t>2016/11/19</a:t>
             </a:fld>
             <a:endParaRPr lang="zh-CN" altLang="en-US"/>
           </a:p>
@@ -6405,7 +6417,8 @@
           <a:p>
             <a:fld id="{E8C06270-71F4-43CB-8AFD-87EE3A9F1952}" type="datetime1">
               <a:rPr lang="zh-CN" altLang="en-US" smtClean="0"/>
-              <a:t>2016/11/9</a:t>
+              <a:pPr/>
+              <a:t>2016/11/19</a:t>
             </a:fld>
             <a:endParaRPr lang="zh-CN" altLang="en-US"/>
           </a:p>
@@ -6611,7 +6624,8 @@
           <a:p>
             <a:fld id="{FC45B130-BA66-446D-8C94-EC498B96FD27}" type="datetime1">
               <a:rPr lang="zh-CN" altLang="en-US" smtClean="0"/>
-              <a:t>2016/11/9</a:t>
+              <a:pPr/>
+              <a:t>2016/11/19</a:t>
             </a:fld>
             <a:endParaRPr lang="zh-CN" altLang="en-US"/>
           </a:p>
@@ -7721,7 +7735,8 @@
           <a:p>
             <a:fld id="{2F60DFC3-5421-4F8E-AB9A-70FCE9810872}" type="datetime1">
               <a:rPr lang="zh-CN" altLang="en-US" smtClean="0"/>
-              <a:t>2016/11/9</a:t>
+              <a:pPr/>
+              <a:t>2016/11/19</a:t>
             </a:fld>
             <a:endParaRPr lang="zh-CN" altLang="en-US"/>
           </a:p>
@@ -8246,7 +8261,12 @@
             <p:ph type="title"/>
           </p:nvPr>
         </p:nvSpPr>
-        <p:spPr/>
+        <p:spPr>
+          <a:xfrm>
+            <a:off x="467544" y="188640"/>
+            <a:ext cx="8229600" cy="1143000"/>
+          </a:xfrm>
+        </p:spPr>
         <p:txBody>
           <a:bodyPr>
             <a:normAutofit/>
@@ -8254,22 +8274,22 @@
           <a:lstStyle/>
           <a:p>
             <a:r>
-              <a:rPr lang="en-US" altLang="zh-CN" dirty="0" smtClean="0"/>
+              <a:rPr lang="en-US" altLang="zh-CN" sz="4000" dirty="0" smtClean="0"/>
               <a:t>Linux</a:t>
             </a:r>
             <a:r>
-              <a:rPr lang="zh-CN" altLang="en-US" dirty="0" smtClean="0"/>
+              <a:rPr lang="zh-CN" altLang="en-US" sz="4000" dirty="0" smtClean="0"/>
               <a:t>应用领域 </a:t>
             </a:r>
             <a:r>
-              <a:rPr lang="en-US" altLang="zh-CN" dirty="0" smtClean="0"/>
+              <a:rPr lang="en-US" altLang="zh-CN" sz="4000" dirty="0" smtClean="0"/>
               <a:t>—</a:t>
             </a:r>
             <a:r>
-              <a:rPr lang="zh-CN" altLang="en-US" dirty="0" smtClean="0"/>
+              <a:rPr lang="zh-CN" altLang="en-US" sz="4000" dirty="0" smtClean="0"/>
               <a:t> 嵌入式</a:t>
             </a:r>
-            <a:endParaRPr lang="zh-CN" altLang="en-US" dirty="0"/>
+            <a:endParaRPr lang="zh-CN" altLang="en-US" sz="4000" dirty="0"/>
           </a:p>
         </p:txBody>
       </p:sp>
@@ -8290,8 +8310,8 @@
         </p:blipFill>
         <p:spPr bwMode="auto">
           <a:xfrm>
-            <a:off x="714348" y="1428736"/>
-            <a:ext cx="6660290" cy="4782539"/>
+            <a:off x="539552" y="1124744"/>
+            <a:ext cx="7560840" cy="5429194"/>
           </a:xfrm>
           <a:prstGeom prst="rect">
             <a:avLst/>
@@ -8313,7 +8333,7 @@
         </p:nvSpPr>
         <p:spPr>
           <a:xfrm>
-            <a:off x="7500958" y="1714488"/>
+            <a:off x="8100392" y="1700808"/>
             <a:ext cx="738664" cy="4071966"/>
           </a:xfrm>
           <a:prstGeom prst="rect">
@@ -8383,11 +8403,7 @@
           <a:p>
             <a:r>
               <a:rPr lang="zh-CN" altLang="en-US" sz="800" dirty="0" smtClean="0"/>
-              <a:t>图片</a:t>
-            </a:r>
-            <a:r>
-              <a:rPr lang="zh-CN" altLang="en-US" sz="800" dirty="0" smtClean="0"/>
-              <a:t>来源</a:t>
+              <a:t>图片来源</a:t>
             </a:r>
             <a:r>
               <a:rPr lang="en-US" altLang="zh-CN" sz="800" dirty="0" smtClean="0"/>
@@ -8434,46 +8450,6 @@
           <a:chExt cx="0" cy="0"/>
         </a:xfrm>
       </p:grpSpPr>
-      <p:sp>
-        <p:nvSpPr>
-          <p:cNvPr id="3" name="标题 2"/>
-          <p:cNvSpPr>
-            <a:spLocks noGrp="1"/>
-          </p:cNvSpPr>
-          <p:nvPr>
-            <p:ph type="title"/>
-          </p:nvPr>
-        </p:nvSpPr>
-        <p:spPr>
-          <a:xfrm rot="16200000">
-            <a:off x="-1257316" y="2257392"/>
-            <a:ext cx="4943452" cy="1143000"/>
-          </a:xfrm>
-        </p:spPr>
-        <p:txBody>
-          <a:bodyPr/>
-          <a:lstStyle/>
-          <a:p>
-            <a:r>
-              <a:rPr lang="en-US" altLang="zh-CN" dirty="0" smtClean="0"/>
-              <a:t>Linux</a:t>
-            </a:r>
-            <a:r>
-              <a:rPr lang="zh-CN" altLang="en-US" dirty="0" smtClean="0"/>
-              <a:t>生态系统（</a:t>
-            </a:r>
-            <a:r>
-              <a:rPr lang="en-US" altLang="zh-CN" dirty="0" smtClean="0"/>
-              <a:t>1</a:t>
-            </a:r>
-            <a:r>
-              <a:rPr lang="zh-CN" altLang="en-US" dirty="0" smtClean="0"/>
-              <a:t>）</a:t>
-            </a:r>
-            <a:endParaRPr lang="zh-CN" altLang="en-US" dirty="0"/>
-          </a:p>
-        </p:txBody>
-      </p:sp>
       <p:pic>
         <p:nvPicPr>
           <p:cNvPr id="4" name="图片 3" descr="Open-Source-Tizen-Project-Samsung-4.png"/>
@@ -8490,7 +8466,7 @@
         </p:blipFill>
         <p:spPr>
           <a:xfrm>
-            <a:off x="2857488" y="0"/>
+            <a:off x="3763274" y="142852"/>
             <a:ext cx="5380726" cy="6715148"/>
           </a:xfrm>
           <a:prstGeom prst="rect">
@@ -8519,6 +8495,106 @@
               <a:t>11</a:t>
             </a:fld>
             <a:endParaRPr lang="zh-CN" altLang="en-US"/>
+          </a:p>
+        </p:txBody>
+      </p:sp>
+      <p:sp>
+        <p:nvSpPr>
+          <p:cNvPr id="3" name="标题 2"/>
+          <p:cNvSpPr>
+            <a:spLocks noGrp="1"/>
+          </p:cNvSpPr>
+          <p:nvPr>
+            <p:ph type="title"/>
+          </p:nvPr>
+        </p:nvSpPr>
+        <p:spPr>
+          <a:xfrm>
+            <a:off x="323528" y="188640"/>
+            <a:ext cx="4943452" cy="1143000"/>
+          </a:xfrm>
+        </p:spPr>
+        <p:txBody>
+          <a:bodyPr>
+            <a:normAutofit/>
+          </a:bodyPr>
+          <a:lstStyle/>
+          <a:p>
+            <a:r>
+              <a:rPr lang="en-US" altLang="zh-CN" sz="4000" dirty="0" smtClean="0"/>
+              <a:t>Linux</a:t>
+            </a:r>
+            <a:r>
+              <a:rPr lang="zh-CN" altLang="en-US" sz="4000" dirty="0" smtClean="0"/>
+              <a:t>生态系统（</a:t>
+            </a:r>
+            <a:r>
+              <a:rPr lang="en-US" altLang="zh-CN" sz="4000" dirty="0" smtClean="0"/>
+              <a:t>1</a:t>
+            </a:r>
+            <a:r>
+              <a:rPr lang="zh-CN" altLang="en-US" sz="4000" dirty="0" smtClean="0"/>
+              <a:t>）</a:t>
+            </a:r>
+            <a:endParaRPr lang="zh-CN" altLang="en-US" sz="4000" dirty="0"/>
+          </a:p>
+        </p:txBody>
+      </p:sp>
+      <p:sp>
+        <p:nvSpPr>
+          <p:cNvPr id="6" name="TextBox 5"/>
+          <p:cNvSpPr txBox="1"/>
+          <p:nvPr/>
+        </p:nvSpPr>
+        <p:spPr>
+          <a:xfrm>
+            <a:off x="683568" y="1700808"/>
+            <a:ext cx="2952328" cy="1200329"/>
+          </a:xfrm>
+          <a:prstGeom prst="rect">
+            <a:avLst/>
+          </a:prstGeom>
+          <a:noFill/>
+        </p:spPr>
+        <p:txBody>
+          <a:bodyPr wrap="square" rtlCol="0">
+            <a:spAutoFit/>
+          </a:bodyPr>
+          <a:lstStyle/>
+          <a:p>
+            <a:r>
+              <a:rPr lang="zh-CN" altLang="en-US" sz="2400" dirty="0" smtClean="0"/>
+              <a:t>三星的</a:t>
+            </a:r>
+            <a:r>
+              <a:rPr lang="en-US" altLang="zh-CN" sz="2400" dirty="0" err="1" smtClean="0"/>
+              <a:t>Tizen</a:t>
+            </a:r>
+            <a:r>
+              <a:rPr lang="en-US" altLang="zh-CN" sz="2400" dirty="0" smtClean="0"/>
+              <a:t>(</a:t>
+            </a:r>
+            <a:r>
+              <a:rPr lang="zh-CN" altLang="en-US" sz="2400" dirty="0" smtClean="0"/>
+              <a:t>一种基于</a:t>
+            </a:r>
+            <a:r>
+              <a:rPr lang="en-US" altLang="zh-CN" sz="2400" dirty="0" smtClean="0"/>
+              <a:t>Linux</a:t>
+            </a:r>
+            <a:r>
+              <a:rPr lang="zh-CN" altLang="en-US" sz="2400" dirty="0" smtClean="0"/>
+              <a:t>的操作系统</a:t>
+            </a:r>
+            <a:r>
+              <a:rPr lang="en-US" altLang="zh-CN" sz="2400" dirty="0" smtClean="0"/>
+              <a:t>)</a:t>
+            </a:r>
+            <a:r>
+              <a:rPr lang="zh-CN" altLang="en-US" sz="2400" dirty="0" smtClean="0"/>
+              <a:t> 生态系统</a:t>
+            </a:r>
+            <a:endParaRPr lang="zh-CN" altLang="en-US" sz="2400" dirty="0"/>
           </a:p>
         </p:txBody>
       </p:sp>
@@ -8547,6 +8623,30 @@
           <a:chExt cx="0" cy="0"/>
         </a:xfrm>
       </p:grpSpPr>
+      <p:pic>
+        <p:nvPicPr>
+          <p:cNvPr id="9" name="图片 8" descr="4a7a1383182636.jpg"/>
+          <p:cNvPicPr>
+            <a:picLocks noChangeAspect="1"/>
+          </p:cNvPicPr>
+          <p:nvPr/>
+        </p:nvPicPr>
+        <p:blipFill>
+          <a:blip r:embed="rId3" cstate="print"/>
+          <a:stretch>
+            <a:fillRect/>
+          </a:stretch>
+        </p:blipFill>
+        <p:spPr>
+          <a:xfrm>
+            <a:off x="3500833" y="2204864"/>
+            <a:ext cx="5352655" cy="4395959"/>
+          </a:xfrm>
+          <a:prstGeom prst="rect">
+            <a:avLst/>
+          </a:prstGeom>
+        </p:spPr>
+      </p:pic>
       <p:sp>
         <p:nvSpPr>
           <p:cNvPr id="3" name="标题 2"/>
@@ -8559,26 +8659,28 @@
         </p:nvSpPr>
         <p:spPr/>
         <p:txBody>
-          <a:bodyPr/>
+          <a:bodyPr>
+            <a:normAutofit/>
+          </a:bodyPr>
           <a:lstStyle/>
           <a:p>
             <a:r>
-              <a:rPr lang="en-US" altLang="zh-CN" dirty="0" smtClean="0"/>
+              <a:rPr lang="en-US" altLang="zh-CN" sz="4000" dirty="0" smtClean="0"/>
               <a:t>Linux</a:t>
             </a:r>
             <a:r>
-              <a:rPr lang="zh-CN" altLang="en-US" dirty="0" smtClean="0"/>
+              <a:rPr lang="zh-CN" altLang="en-US" sz="4000" dirty="0" smtClean="0"/>
               <a:t>生态系统（</a:t>
             </a:r>
             <a:r>
-              <a:rPr lang="en-US" altLang="zh-CN" dirty="0" smtClean="0"/>
+              <a:rPr lang="en-US" altLang="zh-CN" sz="4000" dirty="0" smtClean="0"/>
               <a:t>2</a:t>
             </a:r>
             <a:r>
-              <a:rPr lang="zh-CN" altLang="en-US" dirty="0" smtClean="0"/>
+              <a:rPr lang="zh-CN" altLang="en-US" sz="4000" dirty="0" smtClean="0"/>
               <a:t>）</a:t>
             </a:r>
-            <a:endParaRPr lang="zh-CN" altLang="en-US" dirty="0"/>
+            <a:endParaRPr lang="zh-CN" altLang="en-US" sz="4000" dirty="0"/>
           </a:p>
         </p:txBody>
       </p:sp>
@@ -8630,7 +8732,7 @@
         </p:xfrm>
         <a:graphic>
           <a:graphicData uri="http://schemas.openxmlformats.org/presentationml/2006/ole">
-            <p:oleObj spid="_x0000_s2050" name="包装程序外壳对象" showAsIcon="1" r:id="rId3" imgW="1231920" imgH="712440" progId="Package">
+            <p:oleObj spid="_x0000_s2050" name="包装程序外壳对象" showAsIcon="1" r:id="rId4" imgW="1231920" imgH="712440" progId="Package">
               <p:embed/>
             </p:oleObj>
           </a:graphicData>
@@ -8684,36 +8786,12 @@
         </p:xfrm>
         <a:graphic>
           <a:graphicData uri="http://schemas.openxmlformats.org/presentationml/2006/ole">
-            <p:oleObj spid="_x0000_s2051" name="包装程序外壳对象" showAsIcon="1" r:id="rId4" imgW="3174840" imgH="712440" progId="Package">
+            <p:oleObj spid="_x0000_s2051" name="包装程序外壳对象" showAsIcon="1" r:id="rId5" imgW="3174840" imgH="712440" progId="Package">
               <p:embed/>
             </p:oleObj>
           </a:graphicData>
         </a:graphic>
       </p:graphicFrame>
-      <p:pic>
-        <p:nvPicPr>
-          <p:cNvPr id="9" name="图片 8" descr="4a7a1383182636.jpg"/>
-          <p:cNvPicPr>
-            <a:picLocks noChangeAspect="1"/>
-          </p:cNvPicPr>
-          <p:nvPr/>
-        </p:nvPicPr>
-        <p:blipFill>
-          <a:blip r:embed="rId5" cstate="print"/>
-          <a:stretch>
-            <a:fillRect/>
-          </a:stretch>
-        </p:blipFill>
-        <p:spPr>
-          <a:xfrm>
-            <a:off x="4643438" y="3143248"/>
-            <a:ext cx="4210050" cy="3457575"/>
-          </a:xfrm>
-          <a:prstGeom prst="rect">
-            <a:avLst/>
-          </a:prstGeom>
-        </p:spPr>
-      </p:pic>
       <p:sp>
         <p:nvSpPr>
           <p:cNvPr id="10" name="灯片编号占位符 9"/>
@@ -8782,18 +8860,24 @@
         </p:nvSpPr>
         <p:spPr/>
         <p:txBody>
-          <a:bodyPr/>
+          <a:bodyPr>
+            <a:normAutofit/>
+          </a:bodyPr>
           <a:lstStyle/>
           <a:p>
             <a:r>
-              <a:rPr lang="zh-CN" altLang="en-US" dirty="0" smtClean="0"/>
+              <a:rPr lang="zh-CN" altLang="en-US" sz="4000" dirty="0" smtClean="0"/>
               <a:t>如何学习</a:t>
             </a:r>
             <a:r>
-              <a:rPr lang="en-US" altLang="zh-CN" dirty="0" smtClean="0"/>
-              <a:t>Linux (1)</a:t>
-            </a:r>
-            <a:endParaRPr lang="zh-CN" altLang="en-US" dirty="0"/>
+              <a:rPr lang="en-US" altLang="zh-CN" sz="4000" dirty="0" smtClean="0"/>
+              <a:t>Linux (1</a:t>
+            </a:r>
+            <a:r>
+              <a:rPr lang="en-US" altLang="zh-CN" sz="4000" dirty="0" smtClean="0"/>
+              <a:t>) </a:t>
+            </a:r>
+            <a:endParaRPr lang="zh-CN" altLang="en-US" sz="4000" dirty="0"/>
           </a:p>
         </p:txBody>
       </p:sp>
@@ -8813,8 +8897,8 @@
         </p:blipFill>
         <p:spPr>
           <a:xfrm>
-            <a:off x="3286116" y="1643050"/>
-            <a:ext cx="5460986" cy="4095740"/>
+            <a:off x="2843807" y="1643049"/>
+            <a:ext cx="6029673" cy="4522255"/>
           </a:xfrm>
           <a:prstGeom prst="rect">
             <a:avLst/>
@@ -8829,8 +8913,8 @@
         </p:nvSpPr>
         <p:spPr>
           <a:xfrm>
-            <a:off x="357158" y="1643050"/>
-            <a:ext cx="3071834" cy="2246769"/>
+            <a:off x="179512" y="1700808"/>
+            <a:ext cx="3062714" cy="2308324"/>
           </a:xfrm>
           <a:prstGeom prst="rect">
             <a:avLst/>
@@ -8848,7 +8932,7 @@
               <a:buChar char="•"/>
             </a:pPr>
             <a:r>
-              <a:rPr lang="en-US" altLang="zh-CN" sz="2800" dirty="0" smtClean="0"/>
+              <a:rPr lang="en-US" altLang="zh-CN" sz="2400" dirty="0" smtClean="0"/>
               <a:t> Mailing List</a:t>
             </a:r>
           </a:p>
@@ -8858,14 +8942,14 @@
               <a:buChar char="•"/>
             </a:pPr>
             <a:r>
-              <a:rPr lang="en-US" altLang="zh-CN" sz="2800" dirty="0" smtClean="0"/>
+              <a:rPr lang="en-US" altLang="zh-CN" sz="2400" dirty="0" smtClean="0"/>
               <a:t> </a:t>
             </a:r>
             <a:r>
-              <a:rPr lang="en-US" altLang="zh-CN" sz="2800" dirty="0" err="1" smtClean="0"/>
+              <a:rPr lang="en-US" altLang="zh-CN" sz="2400" dirty="0" err="1" smtClean="0"/>
               <a:t>Git</a:t>
             </a:r>
-            <a:endParaRPr lang="en-US" altLang="zh-CN" sz="2800" dirty="0" smtClean="0"/>
+            <a:endParaRPr lang="en-US" altLang="zh-CN" sz="2400" dirty="0" smtClean="0"/>
           </a:p>
           <a:p>
             <a:pPr>
@@ -8873,7 +8957,7 @@
               <a:buChar char="•"/>
             </a:pPr>
             <a:r>
-              <a:rPr lang="en-US" altLang="zh-CN" sz="2800" dirty="0" smtClean="0"/>
+              <a:rPr lang="en-US" altLang="zh-CN" sz="2400" dirty="0" smtClean="0"/>
               <a:t> Community</a:t>
             </a:r>
           </a:p>
@@ -8883,14 +8967,14 @@
               <a:buChar char="•"/>
             </a:pPr>
             <a:r>
-              <a:rPr lang="en-US" altLang="zh-CN" sz="2800" dirty="0" smtClean="0"/>
+              <a:rPr lang="en-US" altLang="zh-CN" sz="2400" dirty="0" smtClean="0"/>
               <a:t> </a:t>
             </a:r>
             <a:r>
-              <a:rPr lang="en-US" altLang="zh-CN" sz="2800" dirty="0" err="1" smtClean="0"/>
+              <a:rPr lang="en-US" altLang="zh-CN" sz="2400" dirty="0" err="1" smtClean="0"/>
               <a:t>Sourceforge</a:t>
             </a:r>
-            <a:endParaRPr lang="en-US" altLang="zh-CN" sz="2800" dirty="0" smtClean="0"/>
+            <a:endParaRPr lang="en-US" altLang="zh-CN" sz="2400" dirty="0" smtClean="0"/>
           </a:p>
           <a:p>
             <a:pPr>
@@ -8898,14 +8982,29 @@
               <a:buChar char="•"/>
             </a:pPr>
             <a:r>
-              <a:rPr lang="en-US" altLang="zh-CN" sz="2800" dirty="0" smtClean="0"/>
+              <a:rPr lang="en-US" altLang="zh-CN" sz="2400" dirty="0" smtClean="0"/>
               <a:t> </a:t>
             </a:r>
             <a:r>
-              <a:rPr lang="en-US" altLang="zh-CN" sz="2800" dirty="0" err="1" smtClean="0"/>
+              <a:rPr lang="en-US" altLang="zh-CN" sz="2400" dirty="0" err="1" smtClean="0"/>
               <a:t>StackOverflow</a:t>
             </a:r>
-            <a:endParaRPr lang="zh-CN" altLang="en-US" sz="2800" dirty="0"/>
+            <a:endParaRPr lang="en-US" altLang="zh-CN" sz="2400" dirty="0" smtClean="0"/>
+          </a:p>
+          <a:p>
+            <a:pPr>
+              <a:buFont typeface="Arial" pitchFamily="34" charset="0"/>
+              <a:buChar char="•"/>
+            </a:pPr>
+            <a:r>
+              <a:rPr lang="en-US" altLang="zh-CN" sz="2400" dirty="0" smtClean="0"/>
+              <a:t> </a:t>
+            </a:r>
+            <a:r>
+              <a:rPr lang="en-US" altLang="zh-CN" sz="2400" dirty="0" smtClean="0"/>
+              <a:t>www.kernel.org</a:t>
+            </a:r>
+            <a:endParaRPr lang="zh-CN" altLang="en-US" sz="2400" dirty="0"/>
           </a:p>
         </p:txBody>
       </p:sp>
@@ -8995,22 +9094,44 @@
         <p:spPr>
           <a:xfrm>
             <a:off x="214282" y="214290"/>
-            <a:ext cx="5000636" cy="1143000"/>
+            <a:ext cx="8606190" cy="1143000"/>
           </a:xfrm>
         </p:spPr>
         <p:txBody>
-          <a:bodyPr/>
+          <a:bodyPr>
+            <a:normAutofit/>
+          </a:bodyPr>
           <a:lstStyle/>
           <a:p>
             <a:r>
-              <a:rPr lang="zh-CN" altLang="en-US" dirty="0" smtClean="0"/>
+              <a:rPr lang="zh-CN" altLang="en-US" sz="4000" dirty="0" smtClean="0"/>
               <a:t>如何学习</a:t>
             </a:r>
             <a:r>
-              <a:rPr lang="en-US" altLang="zh-CN" dirty="0" smtClean="0"/>
-              <a:t>Linux (2)</a:t>
-            </a:r>
-            <a:endParaRPr lang="zh-CN" altLang="en-US" dirty="0"/>
+              <a:rPr lang="en-US" altLang="zh-CN" sz="4000" dirty="0" smtClean="0"/>
+              <a:t>Linux (2</a:t>
+            </a:r>
+            <a:r>
+              <a:rPr lang="en-US" altLang="zh-CN" sz="4000" dirty="0" smtClean="0"/>
+              <a:t>)</a:t>
+            </a:r>
+            <a:r>
+              <a:rPr lang="zh-CN" altLang="en-US" sz="4000" dirty="0" smtClean="0"/>
+              <a:t> </a:t>
+            </a:r>
+            <a:r>
+              <a:rPr lang="en-US" altLang="zh-CN" sz="4000" dirty="0" smtClean="0"/>
+              <a:t>–</a:t>
+            </a:r>
+            <a:r>
+              <a:rPr lang="en-US" altLang="zh-CN" sz="4000" dirty="0" err="1" smtClean="0"/>
+              <a:t>Git</a:t>
+            </a:r>
+            <a:r>
+              <a:rPr lang="zh-CN" altLang="en-US" sz="4000" dirty="0" smtClean="0"/>
+              <a:t>仓库</a:t>
+            </a:r>
+            <a:endParaRPr lang="zh-CN" altLang="en-US" sz="4000" dirty="0"/>
           </a:p>
         </p:txBody>
       </p:sp>
@@ -9316,6 +9437,279 @@
 </p:sld>
 </file>
 
+<file path=ppt/slides/slide16.xml><?xml version="1.0" encoding="utf-8"?>
+<p:sld xmlns:a="http://schemas.openxmlformats.org/drawingml/2006/main" xmlns:r="http://schemas.openxmlformats.org/officeDocument/2006/relationships" xmlns:p="http://schemas.openxmlformats.org/presentationml/2006/main">
+  <p:cSld>
+    <p:spTree>
+      <p:nvGrpSpPr>
+        <p:cNvPr id="1" name=""/>
+        <p:cNvGrpSpPr/>
+        <p:nvPr/>
+      </p:nvGrpSpPr>
+      <p:grpSpPr>
+        <a:xfrm>
+          <a:off x="0" y="0"/>
+          <a:ext cx="0" cy="0"/>
+          <a:chOff x="0" y="0"/>
+          <a:chExt cx="0" cy="0"/>
+        </a:xfrm>
+      </p:grpSpPr>
+      <p:sp>
+        <p:nvSpPr>
+          <p:cNvPr id="7" name="内容占位符 6"/>
+          <p:cNvSpPr>
+            <a:spLocks noGrp="1"/>
+          </p:cNvSpPr>
+          <p:nvPr>
+            <p:ph idx="1"/>
+          </p:nvPr>
+        </p:nvSpPr>
+        <p:spPr/>
+        <p:txBody>
+          <a:bodyPr>
+            <a:normAutofit fontScale="92500" lnSpcReduction="10000"/>
+          </a:bodyPr>
+          <a:lstStyle/>
+          <a:p>
+            <a:r>
+              <a:rPr lang="en-US" altLang="zh-CN" dirty="0" smtClean="0"/>
+              <a:t>Linux</a:t>
+            </a:r>
+            <a:r>
+              <a:rPr lang="zh-CN" altLang="en-US" dirty="0" smtClean="0"/>
+              <a:t>与</a:t>
+            </a:r>
+            <a:r>
+              <a:rPr lang="en-US" altLang="zh-CN" dirty="0" smtClean="0"/>
+              <a:t>GNU:</a:t>
+            </a:r>
+          </a:p>
+          <a:p>
+            <a:pPr lvl="1"/>
+            <a:r>
+              <a:rPr lang="en-US" altLang="zh-CN" dirty="0" smtClean="0">
+                <a:hlinkClick r:id="rId2"/>
+              </a:rPr>
+              <a:t>https</a:t>
+            </a:r>
+            <a:r>
+              <a:rPr lang="en-US" altLang="zh-CN" dirty="0" smtClean="0">
+                <a:hlinkClick r:id="rId2"/>
+              </a:rPr>
+              <a:t>://</a:t>
+            </a:r>
+            <a:r>
+              <a:rPr lang="en-US" altLang="zh-CN" dirty="0" smtClean="0">
+                <a:hlinkClick r:id="rId2"/>
+              </a:rPr>
+              <a:t>www.gnu.org/gnu/linux-and-gnu.html</a:t>
+            </a:r>
+            <a:endParaRPr lang="en-US" altLang="zh-CN" dirty="0" smtClean="0"/>
+          </a:p>
+          <a:p>
+            <a:r>
+              <a:rPr lang="en-US" altLang="zh-CN" dirty="0" smtClean="0"/>
+              <a:t>GNU</a:t>
+            </a:r>
+            <a:r>
+              <a:rPr lang="zh-CN" altLang="en-US" dirty="0" smtClean="0"/>
+              <a:t>宣言：</a:t>
+            </a:r>
+            <a:endParaRPr lang="en-US" altLang="zh-CN" dirty="0" smtClean="0"/>
+          </a:p>
+          <a:p>
+            <a:pPr lvl="1"/>
+            <a:r>
+              <a:rPr lang="en-US" altLang="zh-CN" dirty="0" smtClean="0">
+                <a:hlinkClick r:id="rId3"/>
+              </a:rPr>
+              <a:t>https://</a:t>
+            </a:r>
+            <a:r>
+              <a:rPr lang="en-US" altLang="zh-CN" dirty="0" smtClean="0">
+                <a:hlinkClick r:id="rId3"/>
+              </a:rPr>
+              <a:t>www.gnu.org/gnu/manifesto.html</a:t>
+            </a:r>
+            <a:endParaRPr lang="en-US" altLang="zh-CN" dirty="0" smtClean="0"/>
+          </a:p>
+          <a:p>
+            <a:r>
+              <a:rPr lang="en-US" altLang="zh-CN" dirty="0" smtClean="0"/>
+              <a:t>GNU</a:t>
+            </a:r>
+            <a:r>
+              <a:rPr lang="zh-CN" altLang="en-US" dirty="0" smtClean="0"/>
+              <a:t>项目的起源</a:t>
+            </a:r>
+            <a:r>
+              <a:rPr lang="en-US" altLang="zh-CN" dirty="0" smtClean="0"/>
+              <a:t>:</a:t>
+            </a:r>
+          </a:p>
+          <a:p>
+            <a:pPr lvl="1"/>
+            <a:r>
+              <a:rPr lang="en-US" altLang="zh-CN" dirty="0" smtClean="0">
+                <a:hlinkClick r:id="rId4"/>
+              </a:rPr>
+              <a:t>https://</a:t>
+            </a:r>
+            <a:r>
+              <a:rPr lang="en-US" altLang="zh-CN" dirty="0" smtClean="0">
+                <a:hlinkClick r:id="rId4"/>
+              </a:rPr>
+              <a:t>www.gnu.org/gnu/the-gnu-project.html</a:t>
+            </a:r>
+            <a:endParaRPr lang="en-US" altLang="zh-CN" dirty="0" smtClean="0"/>
+          </a:p>
+          <a:p>
+            <a:r>
+              <a:rPr lang="en-US" altLang="zh-CN" dirty="0" smtClean="0"/>
+              <a:t>Richard Stallman</a:t>
+            </a:r>
+            <a:r>
+              <a:rPr lang="zh-CN" altLang="en-US" dirty="0" smtClean="0"/>
+              <a:t>的软件哲学</a:t>
+            </a:r>
+            <a:r>
+              <a:rPr lang="en-US" altLang="zh-CN" dirty="0" smtClean="0"/>
+              <a:t>:</a:t>
+            </a:r>
+          </a:p>
+          <a:p>
+            <a:pPr lvl="1"/>
+            <a:r>
+              <a:rPr lang="en-US" altLang="zh-CN" dirty="0" smtClean="0">
+                <a:hlinkClick r:id="rId5"/>
+              </a:rPr>
+              <a:t>https://</a:t>
+            </a:r>
+            <a:r>
+              <a:rPr lang="en-US" altLang="zh-CN" dirty="0" smtClean="0">
+                <a:hlinkClick r:id="rId5"/>
+              </a:rPr>
+              <a:t>www.gnu.org/philosophy/why-free.html</a:t>
+            </a:r>
+            <a:endParaRPr lang="en-US" altLang="zh-CN" dirty="0" smtClean="0"/>
+          </a:p>
+          <a:p>
+            <a:r>
+              <a:rPr lang="zh-CN" altLang="en-US" dirty="0" smtClean="0"/>
+              <a:t>自由</a:t>
+            </a:r>
+            <a:r>
+              <a:rPr lang="zh-CN" altLang="en-US" dirty="0" smtClean="0"/>
+              <a:t>软件的定义</a:t>
+            </a:r>
+            <a:r>
+              <a:rPr lang="en-US" altLang="zh-CN" dirty="0" smtClean="0"/>
+              <a:t>:</a:t>
+            </a:r>
+          </a:p>
+          <a:p>
+            <a:pPr lvl="1"/>
+            <a:r>
+              <a:rPr lang="en-US" altLang="zh-CN" dirty="0" smtClean="0">
+                <a:hlinkClick r:id="rId6"/>
+              </a:rPr>
+              <a:t>https://</a:t>
+            </a:r>
+            <a:r>
+              <a:rPr lang="en-US" altLang="zh-CN" dirty="0" smtClean="0">
+                <a:hlinkClick r:id="rId6"/>
+              </a:rPr>
+              <a:t>www.gnu.org/philosophy/free-sw.html</a:t>
+            </a:r>
+            <a:endParaRPr lang="en-US" altLang="zh-CN" dirty="0" smtClean="0"/>
+          </a:p>
+          <a:p>
+            <a:r>
+              <a:rPr lang="en-US" altLang="zh-CN" dirty="0" smtClean="0"/>
+              <a:t>Unix</a:t>
+            </a:r>
+            <a:r>
+              <a:rPr lang="zh-CN" altLang="en-US" dirty="0" smtClean="0"/>
+              <a:t>传奇</a:t>
+            </a:r>
+            <a:r>
+              <a:rPr lang="en-US" altLang="zh-CN" dirty="0" smtClean="0"/>
+              <a:t>:</a:t>
+            </a:r>
+          </a:p>
+          <a:p>
+            <a:pPr lvl="1"/>
+            <a:r>
+              <a:rPr lang="en-US" altLang="zh-CN" dirty="0" smtClean="0">
+                <a:hlinkClick r:id="rId7"/>
+              </a:rPr>
+              <a:t>http://</a:t>
+            </a:r>
+            <a:r>
+              <a:rPr lang="en-US" altLang="zh-CN" dirty="0" smtClean="0">
+                <a:hlinkClick r:id="rId7"/>
+              </a:rPr>
+              <a:t>coolshell.cn/articles/2322.html</a:t>
+            </a:r>
+            <a:endParaRPr lang="zh-CN" altLang="en-US" dirty="0"/>
+          </a:p>
+        </p:txBody>
+      </p:sp>
+      <p:sp>
+        <p:nvSpPr>
+          <p:cNvPr id="4" name="灯片编号占位符 3"/>
+          <p:cNvSpPr>
+            <a:spLocks noGrp="1"/>
+          </p:cNvSpPr>
+          <p:nvPr>
+            <p:ph type="sldNum" sz="quarter" idx="12"/>
+          </p:nvPr>
+        </p:nvSpPr>
+        <p:spPr/>
+        <p:txBody>
+          <a:bodyPr/>
+          <a:lstStyle/>
+          <a:p>
+            <a:fld id="{0C913308-F349-4B6D-A68A-DD1791B4A57B}" type="slidenum">
+              <a:rPr lang="zh-CN" altLang="en-US" smtClean="0"/>
+              <a:pPr/>
+              <a:t>16</a:t>
+            </a:fld>
+            <a:endParaRPr lang="zh-CN" altLang="en-US"/>
+          </a:p>
+        </p:txBody>
+      </p:sp>
+      <p:sp>
+        <p:nvSpPr>
+          <p:cNvPr id="6" name="标题 5"/>
+          <p:cNvSpPr>
+            <a:spLocks noGrp="1"/>
+          </p:cNvSpPr>
+          <p:nvPr>
+            <p:ph type="title"/>
+          </p:nvPr>
+        </p:nvSpPr>
+        <p:spPr/>
+        <p:txBody>
+          <a:bodyPr/>
+          <a:lstStyle/>
+          <a:p>
+            <a:r>
+              <a:rPr lang="zh-CN" altLang="en-US" dirty="0" smtClean="0"/>
+              <a:t>课后阅读</a:t>
+            </a:r>
+            <a:endParaRPr lang="zh-CN" altLang="en-US" dirty="0"/>
+          </a:p>
+        </p:txBody>
+      </p:sp>
+    </p:spTree>
+  </p:cSld>
+  <p:clrMapOvr>
+    <a:masterClrMapping/>
+  </p:clrMapOvr>
+</p:sld>
+</file>
+
 <file path=ppt/slides/slide2.xml><?xml version="1.0" encoding="utf-8"?>
 <p:sld xmlns:a="http://schemas.openxmlformats.org/drawingml/2006/main" xmlns:r="http://schemas.openxmlformats.org/officeDocument/2006/relationships" xmlns:p="http://schemas.openxmlformats.org/presentationml/2006/main">
   <p:cSld>
@@ -9488,20 +9882,31 @@
             <p:ph type="title"/>
           </p:nvPr>
         </p:nvSpPr>
-        <p:spPr/>
-        <p:txBody>
-          <a:bodyPr/>
+        <p:spPr>
+          <a:xfrm>
+            <a:off x="395536" y="274638"/>
+            <a:ext cx="8568952" cy="1143000"/>
+          </a:xfrm>
+        </p:spPr>
+        <p:txBody>
+          <a:bodyPr>
+            <a:noAutofit/>
+          </a:bodyPr>
           <a:lstStyle/>
           <a:p>
             <a:r>
-              <a:rPr lang="zh-CN" altLang="en-US" dirty="0" smtClean="0"/>
+              <a:rPr lang="zh-CN" altLang="en-US" sz="4000" dirty="0" smtClean="0"/>
               <a:t>什么是</a:t>
             </a:r>
             <a:r>
-              <a:rPr lang="en-US" altLang="zh-CN" dirty="0" smtClean="0"/>
-              <a:t>Linux (1)</a:t>
-            </a:r>
-            <a:endParaRPr lang="zh-CN" altLang="en-US" dirty="0"/>
+              <a:rPr lang="en-US" altLang="zh-CN" sz="4000" dirty="0" smtClean="0"/>
+              <a:t>Linux (1</a:t>
+            </a:r>
+            <a:r>
+              <a:rPr lang="en-US" altLang="zh-CN" sz="4000" dirty="0" smtClean="0"/>
+              <a:t>)-Founding Fathers</a:t>
+            </a:r>
+            <a:endParaRPr lang="zh-CN" altLang="en-US" sz="4000" dirty="0"/>
           </a:p>
         </p:txBody>
       </p:sp>
@@ -9774,7 +10179,7 @@
         <p:spPr>
           <a:xfrm>
             <a:off x="214282" y="1928802"/>
-            <a:ext cx="2911374" cy="369332"/>
+            <a:ext cx="3127779" cy="369332"/>
           </a:xfrm>
           <a:prstGeom prst="rect">
             <a:avLst/>
@@ -9790,7 +10195,19 @@
               <a:rPr lang="en-US" altLang="zh-CN" dirty="0" smtClean="0">
                 <a:hlinkClick r:id="rId15"/>
               </a:rPr>
-              <a:t>http://ftp.gnu.org/gnu/</a:t>
+              <a:t>http</a:t>
+            </a:r>
+            <a:r>
+              <a:rPr lang="en-US" altLang="zh-CN" dirty="0" smtClean="0">
+                <a:hlinkClick r:id="rId15"/>
+              </a:rPr>
+              <a:t>://www.gnu.org/gnu</a:t>
+            </a:r>
+            <a:r>
+              <a:rPr lang="en-US" altLang="zh-CN" dirty="0" smtClean="0">
+                <a:hlinkClick r:id="rId15"/>
+              </a:rPr>
+              <a:t>/</a:t>
             </a:r>
             <a:endParaRPr lang="zh-CN" altLang="en-US" dirty="0"/>
           </a:p>
@@ -9876,13 +10293,13 @@
         </p:nvSpPr>
         <p:spPr>
           <a:xfrm>
-            <a:off x="4786314" y="1142984"/>
+            <a:off x="4788024" y="1196752"/>
             <a:ext cx="1214446" cy="578882"/>
           </a:xfrm>
           <a:prstGeom prst="wedgeRoundRectCallout">
             <a:avLst>
-              <a:gd name="adj1" fmla="val -5160"/>
-              <a:gd name="adj2" fmla="val 73031"/>
+              <a:gd name="adj1" fmla="val -1433"/>
+              <a:gd name="adj2" fmla="val 77723"/>
               <a:gd name="adj3" fmla="val 16667"/>
             </a:avLst>
           </a:prstGeom>
@@ -9915,13 +10332,13 @@
         </p:nvSpPr>
         <p:spPr>
           <a:xfrm>
-            <a:off x="6500826" y="928670"/>
+            <a:off x="7596336" y="1484784"/>
             <a:ext cx="1000132" cy="578882"/>
           </a:xfrm>
           <a:prstGeom prst="wedgeRoundRectCallout">
             <a:avLst>
-              <a:gd name="adj1" fmla="val -5160"/>
-              <a:gd name="adj2" fmla="val 73031"/>
+              <a:gd name="adj1" fmla="val -48611"/>
+              <a:gd name="adj2" fmla="val 71467"/>
               <a:gd name="adj3" fmla="val 16667"/>
             </a:avLst>
           </a:prstGeom>
@@ -10091,11 +10508,7 @@
           <a:p>
             <a:r>
               <a:rPr lang="zh-CN" altLang="en-US" sz="800" dirty="0" smtClean="0"/>
-              <a:t>图片</a:t>
-            </a:r>
-            <a:r>
-              <a:rPr lang="zh-CN" altLang="en-US" sz="800" dirty="0" smtClean="0"/>
-              <a:t>来源</a:t>
+              <a:t>图片来源</a:t>
             </a:r>
             <a:r>
               <a:rPr lang="en-US" altLang="zh-CN" sz="800" dirty="0" smtClean="0"/>
@@ -10170,18 +10583,32 @@
         </p:nvSpPr>
         <p:spPr/>
         <p:txBody>
-          <a:bodyPr/>
+          <a:bodyPr>
+            <a:normAutofit/>
+          </a:bodyPr>
           <a:lstStyle/>
           <a:p>
             <a:r>
-              <a:rPr lang="zh-CN" altLang="en-US" dirty="0" smtClean="0"/>
+              <a:rPr lang="zh-CN" altLang="en-US" sz="4000" dirty="0" smtClean="0"/>
               <a:t>什么是</a:t>
             </a:r>
             <a:r>
-              <a:rPr lang="en-US" altLang="zh-CN" dirty="0" smtClean="0"/>
-              <a:t>Linux (2) </a:t>
-            </a:r>
-            <a:endParaRPr lang="zh-CN" altLang="en-US" dirty="0"/>
+              <a:rPr lang="en-US" altLang="zh-CN" sz="4000" dirty="0" smtClean="0"/>
+              <a:t>Linux (2</a:t>
+            </a:r>
+            <a:r>
+              <a:rPr lang="en-US" altLang="zh-CN" sz="4000" dirty="0" smtClean="0"/>
+              <a:t>)-Unix</a:t>
+            </a:r>
+            <a:r>
+              <a:rPr lang="zh-CN" altLang="en-US" sz="4000" dirty="0" smtClean="0"/>
+              <a:t>族谱</a:t>
+            </a:r>
+            <a:r>
+              <a:rPr lang="en-US" altLang="zh-CN" sz="4000" dirty="0" smtClean="0"/>
+              <a:t>  </a:t>
+            </a:r>
+            <a:endParaRPr lang="zh-CN" altLang="en-US" sz="4000" dirty="0"/>
           </a:p>
         </p:txBody>
       </p:sp>
@@ -10233,11 +10660,7 @@
           <a:p>
             <a:r>
               <a:rPr lang="zh-CN" altLang="en-US" sz="800" dirty="0" smtClean="0"/>
-              <a:t>图片</a:t>
-            </a:r>
-            <a:r>
-              <a:rPr lang="zh-CN" altLang="en-US" sz="800" dirty="0" smtClean="0"/>
-              <a:t>来源</a:t>
+              <a:t>图片来源</a:t>
             </a:r>
             <a:r>
               <a:rPr lang="en-US" altLang="zh-CN" sz="800" dirty="0" smtClean="0"/>
@@ -10312,30 +10735,40 @@
         </p:nvSpPr>
         <p:spPr/>
         <p:txBody>
-          <a:bodyPr/>
+          <a:bodyPr>
+            <a:normAutofit/>
+          </a:bodyPr>
           <a:lstStyle/>
           <a:p>
             <a:r>
-              <a:rPr lang="zh-CN" altLang="en-US" dirty="0" smtClean="0"/>
+              <a:rPr lang="zh-CN" altLang="en-US" sz="4000" dirty="0" smtClean="0"/>
               <a:t>什么是</a:t>
             </a:r>
             <a:r>
-              <a:rPr lang="en-US" altLang="zh-CN" dirty="0" smtClean="0"/>
+              <a:rPr lang="en-US" altLang="zh-CN" sz="4000" dirty="0" smtClean="0"/>
               <a:t>Linux</a:t>
             </a:r>
             <a:r>
-              <a:rPr lang="zh-CN" altLang="en-US" dirty="0" smtClean="0"/>
+              <a:rPr lang="zh-CN" altLang="en-US" sz="4000" dirty="0" smtClean="0"/>
               <a:t>（</a:t>
             </a:r>
             <a:r>
-              <a:rPr lang="en-US" altLang="zh-CN" dirty="0" smtClean="0"/>
+              <a:rPr lang="en-US" altLang="zh-CN" sz="4000" dirty="0" smtClean="0"/>
               <a:t>3</a:t>
             </a:r>
             <a:r>
-              <a:rPr lang="zh-CN" altLang="en-US" dirty="0" smtClean="0"/>
+              <a:rPr lang="zh-CN" altLang="en-US" sz="4000" dirty="0" smtClean="0"/>
               <a:t>）</a:t>
             </a:r>
-            <a:endParaRPr lang="zh-CN" altLang="en-US" dirty="0"/>
+            <a:r>
+              <a:rPr lang="en-US" altLang="zh-CN" sz="4000" dirty="0" smtClean="0"/>
+              <a:t>-Linux</a:t>
+            </a:r>
+            <a:r>
+              <a:rPr lang="zh-CN" altLang="en-US" sz="4000" dirty="0" smtClean="0"/>
+              <a:t>软件栈</a:t>
+            </a:r>
+            <a:endParaRPr lang="zh-CN" altLang="en-US" sz="4000" dirty="0"/>
           </a:p>
         </p:txBody>
       </p:sp>
@@ -10428,7 +10861,7 @@
         </p:blipFill>
         <p:spPr>
           <a:xfrm>
-            <a:off x="230756" y="0"/>
+            <a:off x="251520" y="0"/>
             <a:ext cx="8682487" cy="6858000"/>
           </a:xfrm>
           <a:prstGeom prst="rect">
@@ -10446,8 +10879,8 @@
         </p:nvSpPr>
         <p:spPr>
           <a:xfrm>
-            <a:off x="4857752" y="274638"/>
-            <a:ext cx="3829048" cy="1143000"/>
+            <a:off x="4644008" y="274638"/>
+            <a:ext cx="4042792" cy="1143000"/>
           </a:xfrm>
           <a:prstGeom prst="rect">
             <a:avLst/>
@@ -10475,7 +10908,7 @@
               <a:defRPr/>
             </a:pPr>
             <a:r>
-              <a:rPr kumimoji="0" lang="en-US" altLang="zh-CN" sz="4100" i="0" u="none" strike="noStrike" kern="1200" cap="none" spc="0" normalizeH="0" baseline="0" noProof="0" dirty="0" smtClean="0">
+              <a:rPr kumimoji="0" lang="zh-CN" altLang="en-US" sz="3600" b="1" i="0" u="none" strike="noStrike" kern="1200" cap="none" spc="0" normalizeH="0" baseline="0" noProof="0" dirty="0" smtClean="0">
                 <a:ln>
                   <a:noFill/>
                 </a:ln>
@@ -10491,14 +10924,13 @@
                 </a:effectLst>
                 <a:uLnTx/>
                 <a:uFillTx/>
-                <a:latin typeface="+mj-ea"/>
-                <a:ea typeface="+mj-ea"/>
+                <a:latin typeface="+mn-ea"/>
                 <a:cs typeface="+mj-cs"/>
               </a:rPr>
-              <a:t>UNIX</a:t>
-            </a:r>
-            <a:r>
-              <a:rPr kumimoji="0" lang="zh-CN" altLang="en-US" sz="4100" i="0" u="none" strike="noStrike" kern="1200" cap="none" spc="0" normalizeH="0" baseline="0" noProof="0" dirty="0" smtClean="0">
+              <a:t>另一张</a:t>
+            </a:r>
+            <a:r>
+              <a:rPr kumimoji="0" lang="en-US" altLang="zh-CN" sz="3600" b="1" i="0" u="none" strike="noStrike" kern="1200" cap="none" spc="0" normalizeH="0" baseline="0" noProof="0" dirty="0" smtClean="0">
                 <a:ln>
                   <a:noFill/>
                 </a:ln>
@@ -10514,13 +10946,34 @@
                 </a:effectLst>
                 <a:uLnTx/>
                 <a:uFillTx/>
-                <a:latin typeface="+mj-ea"/>
-                <a:ea typeface="+mj-ea"/>
+                <a:latin typeface="+mn-ea"/>
+                <a:cs typeface="+mj-cs"/>
+              </a:rPr>
+              <a:t>UNIX</a:t>
+            </a:r>
+            <a:r>
+              <a:rPr kumimoji="0" lang="zh-CN" altLang="en-US" sz="3600" b="1" i="0" u="none" strike="noStrike" kern="1200" cap="none" spc="0" normalizeH="0" baseline="0" noProof="0" dirty="0" smtClean="0">
+                <a:ln>
+                  <a:noFill/>
+                </a:ln>
+                <a:solidFill>
+                  <a:schemeClr val="tx2"/>
+                </a:solidFill>
+                <a:effectLst>
+                  <a:outerShdw blurRad="31750" dist="25400" dir="5400000" algn="tl" rotWithShape="0">
+                    <a:srgbClr val="000000">
+                      <a:alpha val="25000"/>
+                    </a:srgbClr>
+                  </a:outerShdw>
+                </a:effectLst>
+                <a:uLnTx/>
+                <a:uFillTx/>
+                <a:latin typeface="+mn-ea"/>
                 <a:cs typeface="+mj-cs"/>
               </a:rPr>
               <a:t>族谱</a:t>
             </a:r>
-            <a:endParaRPr kumimoji="0" lang="zh-CN" altLang="en-US" sz="4100" i="0" u="none" strike="noStrike" kern="1200" cap="none" spc="0" normalizeH="0" baseline="0" noProof="0" dirty="0">
+            <a:endParaRPr kumimoji="0" lang="zh-CN" altLang="en-US" sz="3600" b="1" i="0" u="none" strike="noStrike" kern="1200" cap="none" spc="0" normalizeH="0" baseline="0" noProof="0" dirty="0">
               <a:ln>
                 <a:noFill/>
               </a:ln>
@@ -10536,8 +10989,7 @@
               </a:effectLst>
               <a:uLnTx/>
               <a:uFillTx/>
-              <a:latin typeface="+mj-ea"/>
-              <a:ea typeface="+mj-ea"/>
+              <a:latin typeface="+mn-ea"/>
               <a:cs typeface="+mj-cs"/>
             </a:endParaRPr>
           </a:p>
@@ -10567,11 +11019,7 @@
           <a:p>
             <a:r>
               <a:rPr lang="zh-CN" altLang="en-US" sz="800" dirty="0" smtClean="0"/>
-              <a:t>图片</a:t>
-            </a:r>
-            <a:r>
-              <a:rPr lang="zh-CN" altLang="en-US" sz="800" dirty="0" smtClean="0"/>
-              <a:t>来源</a:t>
+              <a:t>图片来源</a:t>
             </a:r>
             <a:r>
               <a:rPr lang="en-US" altLang="zh-CN" sz="800" dirty="0" smtClean="0"/>
@@ -10653,7 +11101,9 @@
         </p:nvSpPr>
         <p:spPr/>
         <p:txBody>
-          <a:bodyPr/>
+          <a:bodyPr>
+            <a:normAutofit lnSpcReduction="10000"/>
+          </a:bodyPr>
           <a:lstStyle/>
           <a:p>
             <a:r>
@@ -10679,8 +11129,40 @@
           <a:p>
             <a:r>
               <a:rPr lang="en-US" altLang="zh-CN" dirty="0" smtClean="0"/>
-              <a:t>Open Source Software V.S. Free Software</a:t>
-            </a:r>
+              <a:t>Open Source Software V.S. Free </a:t>
+            </a:r>
+            <a:r>
+              <a:rPr lang="en-US" altLang="zh-CN" dirty="0" smtClean="0"/>
+              <a:t>Software</a:t>
+            </a:r>
+          </a:p>
+          <a:p>
+            <a:pPr lvl="1"/>
+            <a:r>
+              <a:rPr lang="en-US" altLang="zh-CN" dirty="0" smtClean="0"/>
+              <a:t>Free</a:t>
+            </a:r>
+            <a:r>
+              <a:rPr lang="zh-CN" altLang="en-US" dirty="0" smtClean="0"/>
+              <a:t>不是“免费”</a:t>
+            </a:r>
+            <a:endParaRPr lang="en-US" altLang="zh-CN" dirty="0" smtClean="0"/>
+          </a:p>
+          <a:p>
+            <a:pPr lvl="1"/>
+            <a:r>
+              <a:rPr lang="zh-CN" altLang="en-US" dirty="0" smtClean="0"/>
+              <a:t>没有</a:t>
+            </a:r>
+            <a:r>
+              <a:rPr lang="zh-CN" altLang="en-US" dirty="0" smtClean="0"/>
+              <a:t>自由软件</a:t>
+            </a:r>
+            <a:r>
+              <a:rPr lang="zh-CN" altLang="en-US" dirty="0" smtClean="0"/>
+              <a:t>也就没有开源软件</a:t>
+            </a:r>
+            <a:endParaRPr lang="en-US" altLang="zh-CN" dirty="0" smtClean="0"/>
           </a:p>
           <a:p>
             <a:r>
@@ -10722,7 +11204,39 @@
           <a:p>
             <a:r>
               <a:rPr lang="zh-CN" altLang="en-US" dirty="0" smtClean="0"/>
-              <a:t>开源与黑客文化</a:t>
+              <a:t>开源与黑客</a:t>
+            </a:r>
+            <a:r>
+              <a:rPr lang="zh-CN" altLang="en-US" dirty="0" smtClean="0"/>
+              <a:t>文化</a:t>
+            </a:r>
+            <a:endParaRPr lang="en-US" altLang="zh-CN" dirty="0" smtClean="0"/>
+          </a:p>
+          <a:p>
+            <a:pPr lvl="1"/>
+            <a:r>
+              <a:rPr lang="en-US" altLang="zh-CN" dirty="0" smtClean="0"/>
+              <a:t>Eric</a:t>
+            </a:r>
+            <a:r>
+              <a:rPr lang="zh-CN" altLang="en-US" dirty="0" smtClean="0"/>
+              <a:t> </a:t>
+            </a:r>
+            <a:r>
+              <a:rPr lang="en-US" altLang="zh-CN" dirty="0" smtClean="0"/>
+              <a:t>Raymond</a:t>
+            </a:r>
+            <a:r>
+              <a:rPr lang="zh-CN" altLang="en-US" dirty="0" smtClean="0"/>
+              <a:t>的“大教堂”与“集市”</a:t>
+            </a:r>
+            <a:endParaRPr lang="en-US" altLang="zh-CN" dirty="0" smtClean="0"/>
+          </a:p>
+          <a:p>
+            <a:pPr lvl="1"/>
+            <a:r>
+              <a:rPr lang="zh-CN" altLang="en-US" dirty="0" smtClean="0"/>
+              <a:t>“黑客”与“黑客精神”</a:t>
             </a:r>
             <a:endParaRPr lang="en-US" altLang="zh-CN" dirty="0" smtClean="0"/>
           </a:p>
@@ -10751,14 +11265,16 @@
         </p:nvSpPr>
         <p:spPr/>
         <p:txBody>
-          <a:bodyPr/>
+          <a:bodyPr>
+            <a:normAutofit/>
+          </a:bodyPr>
           <a:lstStyle/>
           <a:p>
             <a:r>
-              <a:rPr lang="zh-CN" altLang="en-US" dirty="0" smtClean="0"/>
+              <a:rPr lang="zh-CN" altLang="en-US" sz="4000" dirty="0" smtClean="0"/>
               <a:t>开源文化介绍</a:t>
             </a:r>
-            <a:endParaRPr lang="zh-CN" altLang="en-US" dirty="0"/>
+            <a:endParaRPr lang="zh-CN" altLang="en-US" sz="4000" dirty="0"/>
           </a:p>
         </p:txBody>
       </p:sp>
@@ -10830,18 +11346,20 @@
         </p:nvSpPr>
         <p:spPr/>
         <p:txBody>
-          <a:bodyPr/>
+          <a:bodyPr>
+            <a:normAutofit/>
+          </a:bodyPr>
           <a:lstStyle/>
           <a:p>
             <a:r>
-              <a:rPr lang="en-US" altLang="zh-CN" dirty="0" smtClean="0"/>
+              <a:rPr lang="en-US" altLang="zh-CN" sz="4000" dirty="0" smtClean="0"/>
               <a:t>Linux</a:t>
             </a:r>
             <a:r>
-              <a:rPr lang="zh-CN" altLang="en-US" dirty="0" smtClean="0"/>
+              <a:rPr lang="zh-CN" altLang="en-US" sz="4000" dirty="0" smtClean="0"/>
               <a:t>应用领域</a:t>
             </a:r>
-            <a:endParaRPr lang="zh-CN" altLang="en-US" dirty="0"/>
+            <a:endParaRPr lang="zh-CN" altLang="en-US" sz="4000" dirty="0"/>
           </a:p>
         </p:txBody>
       </p:sp>
@@ -10937,26 +11455,28 @@
         </p:nvSpPr>
         <p:spPr/>
         <p:txBody>
-          <a:bodyPr/>
+          <a:bodyPr>
+            <a:normAutofit/>
+          </a:bodyPr>
           <a:lstStyle/>
           <a:p>
             <a:r>
-              <a:rPr lang="en-US" altLang="zh-CN" dirty="0" smtClean="0"/>
+              <a:rPr lang="en-US" altLang="zh-CN" sz="4000" dirty="0" smtClean="0"/>
               <a:t>Linux</a:t>
             </a:r>
             <a:r>
-              <a:rPr lang="zh-CN" altLang="en-US" dirty="0" smtClean="0"/>
+              <a:rPr lang="zh-CN" altLang="en-US" sz="4000" dirty="0" smtClean="0"/>
               <a:t>应用领域 </a:t>
             </a:r>
             <a:r>
-              <a:rPr lang="en-US" altLang="zh-CN" dirty="0" smtClean="0"/>
+              <a:rPr lang="en-US" altLang="zh-CN" sz="4000" dirty="0" smtClean="0"/>
               <a:t>—</a:t>
             </a:r>
             <a:r>
-              <a:rPr lang="zh-CN" altLang="en-US" dirty="0" smtClean="0"/>
+              <a:rPr lang="zh-CN" altLang="en-US" sz="4000" dirty="0" smtClean="0"/>
               <a:t> 服务器领域</a:t>
             </a:r>
-            <a:endParaRPr lang="zh-CN" altLang="en-US" dirty="0"/>
+            <a:endParaRPr lang="zh-CN" altLang="en-US" sz="4000" dirty="0"/>
           </a:p>
         </p:txBody>
       </p:sp>
@@ -10976,8 +11496,8 @@
         </p:blipFill>
         <p:spPr>
           <a:xfrm>
-            <a:off x="1285852" y="1643050"/>
-            <a:ext cx="6878190" cy="4229532"/>
+            <a:off x="683568" y="1412775"/>
+            <a:ext cx="7962906" cy="4896545"/>
           </a:xfrm>
           <a:prstGeom prst="rect">
             <a:avLst/>

</xml_diff>